<commit_message>
clean the data by researchers' hypothesis
</commit_message>
<xml_diff>
--- a/5_Figure/流程图.pptx
+++ b/5_Figure/流程图.pptx
@@ -104,6 +104,11 @@
       </a:defRPr>
     </a:lvl9pPr>
   </p:defaultTextStyle>
+  <p:extLst>
+    <p:ext uri="{EFAFB233-063F-42B5-8137-9DF3F51BA10A}">
+      <p15:sldGuideLst xmlns:p15="http://schemas.microsoft.com/office/powerpoint/2012/main"/>
+    </p:ext>
+  </p:extLst>
 </p:presentation>
 </file>
 
@@ -238,7 +243,7 @@
           <a:p>
             <a:fld id="{013CCCED-8D6B-6847-AF8E-FE3AB64713EA}" type="datetimeFigureOut">
               <a:rPr kumimoji="1" lang="zh-CN" altLang="en-US" smtClean="0"/>
-              <a:t>2022/8/6</a:t>
+              <a:t>2022/8/9</a:t>
             </a:fld>
             <a:endParaRPr kumimoji="1" lang="zh-CN" altLang="en-US"/>
           </a:p>
@@ -408,7 +413,7 @@
           <a:p>
             <a:fld id="{013CCCED-8D6B-6847-AF8E-FE3AB64713EA}" type="datetimeFigureOut">
               <a:rPr kumimoji="1" lang="zh-CN" altLang="en-US" smtClean="0"/>
-              <a:t>2022/8/6</a:t>
+              <a:t>2022/8/9</a:t>
             </a:fld>
             <a:endParaRPr kumimoji="1" lang="zh-CN" altLang="en-US"/>
           </a:p>
@@ -588,7 +593,7 @@
           <a:p>
             <a:fld id="{013CCCED-8D6B-6847-AF8E-FE3AB64713EA}" type="datetimeFigureOut">
               <a:rPr kumimoji="1" lang="zh-CN" altLang="en-US" smtClean="0"/>
-              <a:t>2022/8/6</a:t>
+              <a:t>2022/8/9</a:t>
             </a:fld>
             <a:endParaRPr kumimoji="1" lang="zh-CN" altLang="en-US"/>
           </a:p>
@@ -758,7 +763,7 @@
           <a:p>
             <a:fld id="{013CCCED-8D6B-6847-AF8E-FE3AB64713EA}" type="datetimeFigureOut">
               <a:rPr kumimoji="1" lang="zh-CN" altLang="en-US" smtClean="0"/>
-              <a:t>2022/8/6</a:t>
+              <a:t>2022/8/9</a:t>
             </a:fld>
             <a:endParaRPr kumimoji="1" lang="zh-CN" altLang="en-US"/>
           </a:p>
@@ -1002,7 +1007,7 @@
           <a:p>
             <a:fld id="{013CCCED-8D6B-6847-AF8E-FE3AB64713EA}" type="datetimeFigureOut">
               <a:rPr kumimoji="1" lang="zh-CN" altLang="en-US" smtClean="0"/>
-              <a:t>2022/8/6</a:t>
+              <a:t>2022/8/9</a:t>
             </a:fld>
             <a:endParaRPr kumimoji="1" lang="zh-CN" altLang="en-US"/>
           </a:p>
@@ -1234,7 +1239,7 @@
           <a:p>
             <a:fld id="{013CCCED-8D6B-6847-AF8E-FE3AB64713EA}" type="datetimeFigureOut">
               <a:rPr kumimoji="1" lang="zh-CN" altLang="en-US" smtClean="0"/>
-              <a:t>2022/8/6</a:t>
+              <a:t>2022/8/9</a:t>
             </a:fld>
             <a:endParaRPr kumimoji="1" lang="zh-CN" altLang="en-US"/>
           </a:p>
@@ -1601,7 +1606,7 @@
           <a:p>
             <a:fld id="{013CCCED-8D6B-6847-AF8E-FE3AB64713EA}" type="datetimeFigureOut">
               <a:rPr kumimoji="1" lang="zh-CN" altLang="en-US" smtClean="0"/>
-              <a:t>2022/8/6</a:t>
+              <a:t>2022/8/9</a:t>
             </a:fld>
             <a:endParaRPr kumimoji="1" lang="zh-CN" altLang="en-US"/>
           </a:p>
@@ -1719,7 +1724,7 @@
           <a:p>
             <a:fld id="{013CCCED-8D6B-6847-AF8E-FE3AB64713EA}" type="datetimeFigureOut">
               <a:rPr kumimoji="1" lang="zh-CN" altLang="en-US" smtClean="0"/>
-              <a:t>2022/8/6</a:t>
+              <a:t>2022/8/9</a:t>
             </a:fld>
             <a:endParaRPr kumimoji="1" lang="zh-CN" altLang="en-US"/>
           </a:p>
@@ -1814,7 +1819,7 @@
           <a:p>
             <a:fld id="{013CCCED-8D6B-6847-AF8E-FE3AB64713EA}" type="datetimeFigureOut">
               <a:rPr kumimoji="1" lang="zh-CN" altLang="en-US" smtClean="0"/>
-              <a:t>2022/8/6</a:t>
+              <a:t>2022/8/9</a:t>
             </a:fld>
             <a:endParaRPr kumimoji="1" lang="zh-CN" altLang="en-US"/>
           </a:p>
@@ -2091,7 +2096,7 @@
           <a:p>
             <a:fld id="{013CCCED-8D6B-6847-AF8E-FE3AB64713EA}" type="datetimeFigureOut">
               <a:rPr kumimoji="1" lang="zh-CN" altLang="en-US" smtClean="0"/>
-              <a:t>2022/8/6</a:t>
+              <a:t>2022/8/9</a:t>
             </a:fld>
             <a:endParaRPr kumimoji="1" lang="zh-CN" altLang="en-US"/>
           </a:p>
@@ -2348,7 +2353,7 @@
           <a:p>
             <a:fld id="{013CCCED-8D6B-6847-AF8E-FE3AB64713EA}" type="datetimeFigureOut">
               <a:rPr kumimoji="1" lang="zh-CN" altLang="en-US" smtClean="0"/>
-              <a:t>2022/8/6</a:t>
+              <a:t>2022/8/9</a:t>
             </a:fld>
             <a:endParaRPr kumimoji="1" lang="zh-CN" altLang="en-US"/>
           </a:p>
@@ -2561,7 +2566,7 @@
           <a:p>
             <a:fld id="{013CCCED-8D6B-6847-AF8E-FE3AB64713EA}" type="datetimeFigureOut">
               <a:rPr kumimoji="1" lang="zh-CN" altLang="en-US" smtClean="0"/>
-              <a:t>2022/8/6</a:t>
+              <a:t>2022/8/9</a:t>
             </a:fld>
             <a:endParaRPr kumimoji="1" lang="zh-CN" altLang="en-US"/>
           </a:p>
@@ -2966,599 +2971,712 @@
           <a:chExt cx="0" cy="0"/>
         </a:xfrm>
       </p:grpSpPr>
-      <p:grpSp>
-        <p:nvGrpSpPr>
-          <p:cNvPr id="30" name="组合 29">
+      <p:sp>
+        <p:nvSpPr>
+          <p:cNvPr id="6" name="文本框 5">
             <a:extLst>
               <a:ext uri="{FF2B5EF4-FFF2-40B4-BE49-F238E27FC236}">
-                <a16:creationId xmlns:a16="http://schemas.microsoft.com/office/drawing/2014/main" id="{EE23C428-9A13-6E81-BDE6-D0EAD815F137}"/>
+                <a16:creationId xmlns:a16="http://schemas.microsoft.com/office/drawing/2014/main" id="{1613ED68-D28E-35CE-71E3-2F5A254A5D68}"/>
               </a:ext>
             </a:extLst>
           </p:cNvPr>
-          <p:cNvGrpSpPr/>
+          <p:cNvSpPr txBox="1">
+            <a:spLocks/>
+          </p:cNvSpPr>
           <p:nvPr/>
-        </p:nvGrpSpPr>
-        <p:grpSpPr>
+        </p:nvSpPr>
+        <p:spPr>
           <a:xfrm>
-            <a:off x="1135418" y="1008000"/>
-            <a:ext cx="6277615" cy="4448216"/>
-            <a:chOff x="1135418" y="1008000"/>
-            <a:chExt cx="6277615" cy="4448216"/>
+            <a:off x="3363684" y="24531"/>
+            <a:ext cx="1799313" cy="495951"/>
           </a:xfrm>
-        </p:grpSpPr>
-        <p:sp>
-          <p:nvSpPr>
-            <p:cNvPr id="6" name="文本框 5">
-              <a:extLst>
-                <a:ext uri="{FF2B5EF4-FFF2-40B4-BE49-F238E27FC236}">
-                  <a16:creationId xmlns:a16="http://schemas.microsoft.com/office/drawing/2014/main" id="{1613ED68-D28E-35CE-71E3-2F5A254A5D68}"/>
-                </a:ext>
-              </a:extLst>
-            </p:cNvPr>
-            <p:cNvSpPr txBox="1">
-              <a:spLocks/>
-            </p:cNvSpPr>
-            <p:nvPr/>
-          </p:nvSpPr>
-          <p:spPr>
-            <a:xfrm>
-              <a:off x="3374570" y="1008000"/>
-              <a:ext cx="1799313" cy="495951"/>
-            </a:xfrm>
-            <a:prstGeom prst="rect">
-              <a:avLst/>
-            </a:prstGeom>
-            <a:noFill/>
-            <a:ln w="12700">
-              <a:solidFill>
-                <a:schemeClr val="tx1"/>
-              </a:solidFill>
-            </a:ln>
-          </p:spPr>
-          <p:txBody>
-            <a:bodyPr wrap="square" lIns="108000" tIns="72000" rIns="108000" bIns="72000" rtlCol="0" anchor="ctr" anchorCtr="1">
-              <a:spAutoFit/>
-            </a:bodyPr>
-            <a:lstStyle/>
-            <a:p>
-              <a:pPr algn="ctr">
-                <a:lnSpc>
-                  <a:spcPct val="150000"/>
-                </a:lnSpc>
-              </a:pPr>
-              <a:r>
-                <a:rPr kumimoji="1" lang="zh-CN" altLang="en-US" dirty="0">
-                  <a:latin typeface="SimSun" panose="02010600030101010101" pitchFamily="2" charset="-122"/>
-                  <a:ea typeface="SimSun" panose="02010600030101010101" pitchFamily="2" charset="-122"/>
-                </a:rPr>
-                <a:t>设置停止阈值</a:t>
-              </a:r>
-            </a:p>
-          </p:txBody>
-        </p:sp>
-        <p:sp>
-          <p:nvSpPr>
-            <p:cNvPr id="8" name="文本框 7">
-              <a:extLst>
-                <a:ext uri="{FF2B5EF4-FFF2-40B4-BE49-F238E27FC236}">
-                  <a16:creationId xmlns:a16="http://schemas.microsoft.com/office/drawing/2014/main" id="{10D790DA-D88A-066F-7AC0-53AB0474E011}"/>
-                </a:ext>
-              </a:extLst>
-            </p:cNvPr>
-            <p:cNvSpPr txBox="1">
-              <a:spLocks/>
-            </p:cNvSpPr>
-            <p:nvPr/>
-          </p:nvSpPr>
-          <p:spPr>
-            <a:xfrm>
-              <a:off x="3629213" y="2160193"/>
-              <a:ext cx="1290026" cy="495951"/>
-            </a:xfrm>
-            <a:prstGeom prst="rect">
-              <a:avLst/>
-            </a:prstGeom>
-            <a:noFill/>
-            <a:ln w="12700">
-              <a:solidFill>
-                <a:schemeClr val="tx1"/>
-              </a:solidFill>
-            </a:ln>
-          </p:spPr>
-          <p:txBody>
-            <a:bodyPr wrap="square" lIns="108000" tIns="72000" rIns="108000" bIns="72000" rtlCol="0" anchor="ctr" anchorCtr="1">
-              <a:spAutoFit/>
-            </a:bodyPr>
-            <a:lstStyle/>
-            <a:p>
-              <a:pPr algn="ctr">
-                <a:lnSpc>
-                  <a:spcPct val="150000"/>
-                </a:lnSpc>
-              </a:pPr>
-              <a:r>
-                <a:rPr kumimoji="1" lang="zh-CN" altLang="en-US" dirty="0">
-                  <a:latin typeface="SimSun" panose="02010600030101010101" pitchFamily="2" charset="-122"/>
-                  <a:ea typeface="SimSun" panose="02010600030101010101" pitchFamily="2" charset="-122"/>
-                </a:rPr>
-                <a:t>收集数据</a:t>
-              </a:r>
-            </a:p>
-          </p:txBody>
-        </p:sp>
-        <p:sp>
-          <p:nvSpPr>
-            <p:cNvPr id="9" name="文本框 8">
-              <a:extLst>
-                <a:ext uri="{FF2B5EF4-FFF2-40B4-BE49-F238E27FC236}">
-                  <a16:creationId xmlns:a16="http://schemas.microsoft.com/office/drawing/2014/main" id="{60B30768-F6E3-AE36-7E9A-F124C7195DBE}"/>
-                </a:ext>
-              </a:extLst>
-            </p:cNvPr>
-            <p:cNvSpPr txBox="1">
-              <a:spLocks/>
-            </p:cNvSpPr>
-            <p:nvPr/>
-          </p:nvSpPr>
-          <p:spPr>
-            <a:xfrm>
-              <a:off x="2876857" y="3345633"/>
-              <a:ext cx="2794737" cy="495951"/>
-            </a:xfrm>
-            <a:prstGeom prst="rect">
-              <a:avLst/>
-            </a:prstGeom>
-            <a:noFill/>
-            <a:ln w="12700">
-              <a:solidFill>
-                <a:schemeClr val="tx1"/>
-              </a:solidFill>
-            </a:ln>
-          </p:spPr>
-          <p:txBody>
-            <a:bodyPr wrap="square" lIns="108000" tIns="72000" rIns="108000" bIns="72000" rtlCol="0" anchor="ctr" anchorCtr="1">
-              <a:spAutoFit/>
-            </a:bodyPr>
-            <a:lstStyle/>
-            <a:p>
-              <a:pPr algn="ctr">
-                <a:lnSpc>
-                  <a:spcPct val="150000"/>
-                </a:lnSpc>
-              </a:pPr>
-              <a:r>
-                <a:rPr kumimoji="1" lang="zh-CN" altLang="en-US" dirty="0">
-                  <a:latin typeface="SimSun" panose="02010600030101010101" pitchFamily="2" charset="-122"/>
-                  <a:ea typeface="SimSun" panose="02010600030101010101" pitchFamily="2" charset="-122"/>
-                </a:rPr>
-                <a:t>跟据先验计算贝叶斯因子</a:t>
-              </a:r>
-            </a:p>
-          </p:txBody>
-        </p:sp>
-        <p:sp>
-          <p:nvSpPr>
-            <p:cNvPr id="10" name="文本框 9">
-              <a:extLst>
-                <a:ext uri="{FF2B5EF4-FFF2-40B4-BE49-F238E27FC236}">
-                  <a16:creationId xmlns:a16="http://schemas.microsoft.com/office/drawing/2014/main" id="{9E866518-A398-9E84-F6C6-7D69104CADED}"/>
-                </a:ext>
-              </a:extLst>
-            </p:cNvPr>
-            <p:cNvSpPr txBox="1">
-              <a:spLocks/>
-            </p:cNvSpPr>
-            <p:nvPr/>
-          </p:nvSpPr>
-          <p:spPr>
-            <a:xfrm>
-              <a:off x="1135418" y="4928469"/>
-              <a:ext cx="1290026" cy="495951"/>
-            </a:xfrm>
-            <a:prstGeom prst="rect">
-              <a:avLst/>
-            </a:prstGeom>
-            <a:noFill/>
-            <a:ln w="12700">
-              <a:solidFill>
-                <a:schemeClr val="tx1"/>
-              </a:solidFill>
-            </a:ln>
-          </p:spPr>
-          <p:txBody>
-            <a:bodyPr wrap="square" lIns="108000" tIns="72000" rIns="108000" bIns="72000" rtlCol="0" anchor="ctr" anchorCtr="1">
-              <a:spAutoFit/>
-            </a:bodyPr>
-            <a:lstStyle/>
-            <a:p>
-              <a:pPr algn="ctr">
-                <a:lnSpc>
-                  <a:spcPct val="150000"/>
-                </a:lnSpc>
-              </a:pPr>
-              <a:r>
-                <a:rPr kumimoji="1" lang="zh-CN" altLang="en-US" dirty="0">
-                  <a:latin typeface="SimSun" panose="02010600030101010101" pitchFamily="2" charset="-122"/>
-                  <a:ea typeface="SimSun" panose="02010600030101010101" pitchFamily="2" charset="-122"/>
-                </a:rPr>
-                <a:t>大于阈值</a:t>
-              </a:r>
-            </a:p>
-          </p:txBody>
-        </p:sp>
-        <p:sp>
-          <p:nvSpPr>
-            <p:cNvPr id="11" name="文本框 10">
-              <a:extLst>
-                <a:ext uri="{FF2B5EF4-FFF2-40B4-BE49-F238E27FC236}">
-                  <a16:creationId xmlns:a16="http://schemas.microsoft.com/office/drawing/2014/main" id="{C6F3A263-F583-7718-2E75-87695186F583}"/>
-                </a:ext>
-              </a:extLst>
-            </p:cNvPr>
-            <p:cNvSpPr txBox="1">
-              <a:spLocks/>
-            </p:cNvSpPr>
-            <p:nvPr/>
-          </p:nvSpPr>
-          <p:spPr>
-            <a:xfrm>
-              <a:off x="6123007" y="4960265"/>
-              <a:ext cx="1290026" cy="495951"/>
-            </a:xfrm>
-            <a:prstGeom prst="rect">
-              <a:avLst/>
-            </a:prstGeom>
-            <a:noFill/>
-            <a:ln w="12700">
-              <a:solidFill>
-                <a:schemeClr val="tx1"/>
-              </a:solidFill>
-            </a:ln>
-          </p:spPr>
-          <p:txBody>
-            <a:bodyPr wrap="square" lIns="108000" tIns="72000" rIns="108000" bIns="72000" rtlCol="0" anchor="ctr" anchorCtr="1">
-              <a:spAutoFit/>
-            </a:bodyPr>
-            <a:lstStyle/>
-            <a:p>
-              <a:pPr algn="ctr">
-                <a:lnSpc>
-                  <a:spcPct val="150000"/>
-                </a:lnSpc>
-              </a:pPr>
-              <a:r>
-                <a:rPr kumimoji="1" lang="zh-CN" altLang="en-US" dirty="0">
-                  <a:latin typeface="SimSun" panose="02010600030101010101" pitchFamily="2" charset="-122"/>
-                  <a:ea typeface="SimSun" panose="02010600030101010101" pitchFamily="2" charset="-122"/>
-                </a:rPr>
-                <a:t>小于阈值</a:t>
-              </a:r>
-            </a:p>
-          </p:txBody>
-        </p:sp>
-        <p:sp>
-          <p:nvSpPr>
-            <p:cNvPr id="12" name="文本框 11">
-              <a:extLst>
-                <a:ext uri="{FF2B5EF4-FFF2-40B4-BE49-F238E27FC236}">
-                  <a16:creationId xmlns:a16="http://schemas.microsoft.com/office/drawing/2014/main" id="{5A8A9BD2-053C-B738-4232-3379B6C05327}"/>
-                </a:ext>
-              </a:extLst>
-            </p:cNvPr>
-            <p:cNvSpPr txBox="1">
-              <a:spLocks/>
-            </p:cNvSpPr>
-            <p:nvPr/>
-          </p:nvSpPr>
-          <p:spPr>
-            <a:xfrm>
-              <a:off x="2876857" y="4928470"/>
-              <a:ext cx="2794737" cy="495951"/>
-            </a:xfrm>
-            <a:prstGeom prst="rect">
-              <a:avLst/>
-            </a:prstGeom>
-            <a:noFill/>
-            <a:ln w="12700">
-              <a:solidFill>
-                <a:schemeClr val="tx1"/>
-              </a:solidFill>
-            </a:ln>
-          </p:spPr>
-          <p:txBody>
-            <a:bodyPr wrap="square" lIns="108000" tIns="72000" rIns="108000" bIns="72000" rtlCol="0" anchor="ctr" anchorCtr="1">
-              <a:spAutoFit/>
-            </a:bodyPr>
-            <a:lstStyle/>
-            <a:p>
-              <a:pPr algn="ctr">
-                <a:lnSpc>
-                  <a:spcPct val="150000"/>
-                </a:lnSpc>
-              </a:pPr>
-              <a:r>
-                <a:rPr kumimoji="1" lang="zh-CN" altLang="en-US" dirty="0">
-                  <a:latin typeface="SimSun" panose="02010600030101010101" pitchFamily="2" charset="-122"/>
-                  <a:ea typeface="SimSun" panose="02010600030101010101" pitchFamily="2" charset="-122"/>
-                </a:rPr>
-                <a:t>达到可收集的最大样本量</a:t>
-              </a:r>
-            </a:p>
-          </p:txBody>
-        </p:sp>
-        <p:cxnSp>
-          <p:nvCxnSpPr>
-            <p:cNvPr id="19" name="直线箭头连接符 18">
-              <a:extLst>
-                <a:ext uri="{FF2B5EF4-FFF2-40B4-BE49-F238E27FC236}">
-                  <a16:creationId xmlns:a16="http://schemas.microsoft.com/office/drawing/2014/main" id="{9A281429-C354-A33B-1A5A-1A300AFFE23B}"/>
-                </a:ext>
-              </a:extLst>
-            </p:cNvPr>
-            <p:cNvCxnSpPr>
-              <a:stCxn id="6" idx="2"/>
-              <a:endCxn id="8" idx="0"/>
-            </p:cNvCxnSpPr>
-            <p:nvPr/>
-          </p:nvCxnSpPr>
-          <p:spPr>
-            <a:xfrm flipH="1">
-              <a:off x="4274226" y="1503951"/>
-              <a:ext cx="1" cy="656242"/>
-            </a:xfrm>
-            <a:prstGeom prst="straightConnector1">
-              <a:avLst/>
-            </a:prstGeom>
-            <a:ln w="12700">
-              <a:solidFill>
-                <a:schemeClr val="tx1"/>
-              </a:solidFill>
-              <a:tailEnd type="triangle"/>
-            </a:ln>
-          </p:spPr>
-          <p:style>
-            <a:lnRef idx="1">
-              <a:schemeClr val="accent1"/>
-            </a:lnRef>
-            <a:fillRef idx="0">
-              <a:schemeClr val="accent1"/>
-            </a:fillRef>
-            <a:effectRef idx="0">
-              <a:schemeClr val="accent1"/>
-            </a:effectRef>
-            <a:fontRef idx="minor">
+          <a:prstGeom prst="rect">
+            <a:avLst/>
+          </a:prstGeom>
+          <a:noFill/>
+          <a:ln w="12700">
+            <a:solidFill>
               <a:schemeClr val="tx1"/>
-            </a:fontRef>
-          </p:style>
-        </p:cxnSp>
-        <p:cxnSp>
-          <p:nvCxnSpPr>
-            <p:cNvPr id="20" name="直线箭头连接符 19">
-              <a:extLst>
-                <a:ext uri="{FF2B5EF4-FFF2-40B4-BE49-F238E27FC236}">
-                  <a16:creationId xmlns:a16="http://schemas.microsoft.com/office/drawing/2014/main" id="{BDFC6DB0-DF8D-4368-CA3E-F5D7B8910AD6}"/>
-                </a:ext>
-              </a:extLst>
-            </p:cNvPr>
-            <p:cNvCxnSpPr>
-              <a:cxnSpLocks/>
-              <a:endCxn id="9" idx="0"/>
-            </p:cNvCxnSpPr>
-            <p:nvPr/>
-          </p:nvCxnSpPr>
-          <p:spPr>
-            <a:xfrm>
-              <a:off x="4274226" y="2636267"/>
-              <a:ext cx="0" cy="709366"/>
-            </a:xfrm>
-            <a:prstGeom prst="straightConnector1">
-              <a:avLst/>
-            </a:prstGeom>
-            <a:ln w="12700">
-              <a:solidFill>
-                <a:schemeClr val="tx1"/>
-              </a:solidFill>
-              <a:tailEnd type="triangle"/>
-            </a:ln>
-          </p:spPr>
-          <p:style>
-            <a:lnRef idx="1">
-              <a:schemeClr val="accent1"/>
-            </a:lnRef>
-            <a:fillRef idx="0">
-              <a:schemeClr val="accent1"/>
-            </a:fillRef>
-            <a:effectRef idx="0">
-              <a:schemeClr val="accent1"/>
-            </a:effectRef>
-            <a:fontRef idx="minor">
+            </a:solidFill>
+          </a:ln>
+        </p:spPr>
+        <p:txBody>
+          <a:bodyPr wrap="square" lIns="108000" tIns="72000" rIns="108000" bIns="72000" rtlCol="0" anchor="ctr" anchorCtr="1">
+            <a:spAutoFit/>
+          </a:bodyPr>
+          <a:lstStyle/>
+          <a:p>
+            <a:pPr algn="ctr">
+              <a:lnSpc>
+                <a:spcPct val="150000"/>
+              </a:lnSpc>
+            </a:pPr>
+            <a:r>
+              <a:rPr kumimoji="1" lang="zh-CN" altLang="en-US" dirty="0">
+                <a:latin typeface="SimSun" panose="02010600030101010101" pitchFamily="2" charset="-122"/>
+                <a:ea typeface="SimSun" panose="02010600030101010101" pitchFamily="2" charset="-122"/>
+              </a:rPr>
+              <a:t>设置停止阈值</a:t>
+            </a:r>
+          </a:p>
+        </p:txBody>
+      </p:sp>
+      <p:sp>
+        <p:nvSpPr>
+          <p:cNvPr id="8" name="文本框 7">
+            <a:extLst>
+              <a:ext uri="{FF2B5EF4-FFF2-40B4-BE49-F238E27FC236}">
+                <a16:creationId xmlns:a16="http://schemas.microsoft.com/office/drawing/2014/main" id="{10D790DA-D88A-066F-7AC0-53AB0474E011}"/>
+              </a:ext>
+            </a:extLst>
+          </p:cNvPr>
+          <p:cNvSpPr txBox="1">
+            <a:spLocks/>
+          </p:cNvSpPr>
+          <p:nvPr/>
+        </p:nvSpPr>
+        <p:spPr>
+          <a:xfrm>
+            <a:off x="3618327" y="1176724"/>
+            <a:ext cx="1290026" cy="495951"/>
+          </a:xfrm>
+          <a:prstGeom prst="rect">
+            <a:avLst/>
+          </a:prstGeom>
+          <a:noFill/>
+          <a:ln w="12700">
+            <a:solidFill>
               <a:schemeClr val="tx1"/>
-            </a:fontRef>
-          </p:style>
-        </p:cxnSp>
-        <p:cxnSp>
-          <p:nvCxnSpPr>
-            <p:cNvPr id="22" name="直线箭头连接符 21">
-              <a:extLst>
-                <a:ext uri="{FF2B5EF4-FFF2-40B4-BE49-F238E27FC236}">
-                  <a16:creationId xmlns:a16="http://schemas.microsoft.com/office/drawing/2014/main" id="{D12B0A56-CDB5-43DD-9F6C-CC4A0B291173}"/>
-                </a:ext>
-              </a:extLst>
-            </p:cNvPr>
-            <p:cNvCxnSpPr>
-              <a:cxnSpLocks/>
-              <a:endCxn id="12" idx="0"/>
-            </p:cNvCxnSpPr>
-            <p:nvPr/>
-          </p:nvCxnSpPr>
-          <p:spPr>
-            <a:xfrm flipH="1">
-              <a:off x="4274226" y="3841584"/>
-              <a:ext cx="5096" cy="1086886"/>
-            </a:xfrm>
-            <a:prstGeom prst="straightConnector1">
-              <a:avLst/>
-            </a:prstGeom>
-            <a:ln w="12700">
-              <a:solidFill>
-                <a:schemeClr val="tx1"/>
-              </a:solidFill>
-              <a:tailEnd type="triangle"/>
-            </a:ln>
-          </p:spPr>
-          <p:style>
-            <a:lnRef idx="1">
-              <a:schemeClr val="accent1"/>
-            </a:lnRef>
-            <a:fillRef idx="0">
-              <a:schemeClr val="accent1"/>
-            </a:fillRef>
-            <a:effectRef idx="0">
-              <a:schemeClr val="accent1"/>
-            </a:effectRef>
-            <a:fontRef idx="minor">
+            </a:solidFill>
+          </a:ln>
+        </p:spPr>
+        <p:txBody>
+          <a:bodyPr wrap="square" lIns="108000" tIns="72000" rIns="108000" bIns="72000" rtlCol="0" anchor="ctr" anchorCtr="1">
+            <a:spAutoFit/>
+          </a:bodyPr>
+          <a:lstStyle/>
+          <a:p>
+            <a:pPr algn="ctr">
+              <a:lnSpc>
+                <a:spcPct val="150000"/>
+              </a:lnSpc>
+            </a:pPr>
+            <a:r>
+              <a:rPr kumimoji="1" lang="zh-CN" altLang="en-US" dirty="0">
+                <a:latin typeface="SimSun" panose="02010600030101010101" pitchFamily="2" charset="-122"/>
+                <a:ea typeface="SimSun" panose="02010600030101010101" pitchFamily="2" charset="-122"/>
+              </a:rPr>
+              <a:t>收集数据</a:t>
+            </a:r>
+          </a:p>
+        </p:txBody>
+      </p:sp>
+      <p:sp>
+        <p:nvSpPr>
+          <p:cNvPr id="9" name="文本框 8">
+            <a:extLst>
+              <a:ext uri="{FF2B5EF4-FFF2-40B4-BE49-F238E27FC236}">
+                <a16:creationId xmlns:a16="http://schemas.microsoft.com/office/drawing/2014/main" id="{60B30768-F6E3-AE36-7E9A-F124C7195DBE}"/>
+              </a:ext>
+            </a:extLst>
+          </p:cNvPr>
+          <p:cNvSpPr txBox="1">
+            <a:spLocks/>
+          </p:cNvSpPr>
+          <p:nvPr/>
+        </p:nvSpPr>
+        <p:spPr>
+          <a:xfrm>
+            <a:off x="2865971" y="2362164"/>
+            <a:ext cx="2794737" cy="495951"/>
+          </a:xfrm>
+          <a:prstGeom prst="rect">
+            <a:avLst/>
+          </a:prstGeom>
+          <a:noFill/>
+          <a:ln w="12700">
+            <a:solidFill>
               <a:schemeClr val="tx1"/>
-            </a:fontRef>
-          </p:style>
-        </p:cxnSp>
-        <p:cxnSp>
-          <p:nvCxnSpPr>
-            <p:cNvPr id="25" name="肘形连接符 24">
-              <a:extLst>
-                <a:ext uri="{FF2B5EF4-FFF2-40B4-BE49-F238E27FC236}">
-                  <a16:creationId xmlns:a16="http://schemas.microsoft.com/office/drawing/2014/main" id="{1F121301-0924-8857-7B64-34C49FA7A649}"/>
-                </a:ext>
-              </a:extLst>
-            </p:cNvPr>
-            <p:cNvCxnSpPr>
-              <a:stCxn id="9" idx="1"/>
-              <a:endCxn id="10" idx="0"/>
-            </p:cNvCxnSpPr>
-            <p:nvPr/>
-          </p:nvCxnSpPr>
-          <p:spPr>
-            <a:xfrm rot="10800000" flipV="1">
-              <a:off x="1780431" y="3593609"/>
-              <a:ext cx="1096426" cy="1334860"/>
-            </a:xfrm>
-            <a:prstGeom prst="bentConnector2">
-              <a:avLst/>
-            </a:prstGeom>
-            <a:ln w="12700">
-              <a:solidFill>
-                <a:schemeClr val="tx1"/>
-              </a:solidFill>
-              <a:tailEnd type="triangle"/>
-            </a:ln>
-          </p:spPr>
-          <p:style>
-            <a:lnRef idx="1">
-              <a:schemeClr val="accent1"/>
-            </a:lnRef>
-            <a:fillRef idx="0">
-              <a:schemeClr val="accent1"/>
-            </a:fillRef>
-            <a:effectRef idx="0">
-              <a:schemeClr val="accent1"/>
-            </a:effectRef>
-            <a:fontRef idx="minor">
+            </a:solidFill>
+          </a:ln>
+        </p:spPr>
+        <p:txBody>
+          <a:bodyPr wrap="square" lIns="108000" tIns="72000" rIns="108000" bIns="72000" rtlCol="0" anchor="ctr" anchorCtr="1">
+            <a:spAutoFit/>
+          </a:bodyPr>
+          <a:lstStyle/>
+          <a:p>
+            <a:pPr algn="ctr">
+              <a:lnSpc>
+                <a:spcPct val="150000"/>
+              </a:lnSpc>
+            </a:pPr>
+            <a:r>
+              <a:rPr kumimoji="1" lang="zh-CN" altLang="en-US" dirty="0">
+                <a:latin typeface="SimSun" panose="02010600030101010101" pitchFamily="2" charset="-122"/>
+                <a:ea typeface="SimSun" panose="02010600030101010101" pitchFamily="2" charset="-122"/>
+              </a:rPr>
+              <a:t>跟据先验计算贝叶斯因子</a:t>
+            </a:r>
+          </a:p>
+        </p:txBody>
+      </p:sp>
+      <p:sp>
+        <p:nvSpPr>
+          <p:cNvPr id="10" name="文本框 9">
+            <a:extLst>
+              <a:ext uri="{FF2B5EF4-FFF2-40B4-BE49-F238E27FC236}">
+                <a16:creationId xmlns:a16="http://schemas.microsoft.com/office/drawing/2014/main" id="{9E866518-A398-9E84-F6C6-7D69104CADED}"/>
+              </a:ext>
+            </a:extLst>
+          </p:cNvPr>
+          <p:cNvSpPr txBox="1">
+            <a:spLocks/>
+          </p:cNvSpPr>
+          <p:nvPr/>
+        </p:nvSpPr>
+        <p:spPr>
+          <a:xfrm>
+            <a:off x="1124532" y="3945000"/>
+            <a:ext cx="1290026" cy="495951"/>
+          </a:xfrm>
+          <a:prstGeom prst="rect">
+            <a:avLst/>
+          </a:prstGeom>
+          <a:noFill/>
+          <a:ln w="12700">
+            <a:solidFill>
               <a:schemeClr val="tx1"/>
-            </a:fontRef>
-          </p:style>
-        </p:cxnSp>
-        <p:cxnSp>
-          <p:nvCxnSpPr>
-            <p:cNvPr id="27" name="肘形连接符 26">
-              <a:extLst>
-                <a:ext uri="{FF2B5EF4-FFF2-40B4-BE49-F238E27FC236}">
-                  <a16:creationId xmlns:a16="http://schemas.microsoft.com/office/drawing/2014/main" id="{027C94CA-48D6-7855-A05B-6DCD58DA7697}"/>
-                </a:ext>
-              </a:extLst>
-            </p:cNvPr>
-            <p:cNvCxnSpPr>
-              <a:stCxn id="9" idx="3"/>
-              <a:endCxn id="11" idx="0"/>
-            </p:cNvCxnSpPr>
-            <p:nvPr/>
-          </p:nvCxnSpPr>
-          <p:spPr>
-            <a:xfrm>
-              <a:off x="5671594" y="3593609"/>
-              <a:ext cx="1096426" cy="1366656"/>
-            </a:xfrm>
-            <a:prstGeom prst="bentConnector2">
-              <a:avLst/>
-            </a:prstGeom>
-            <a:ln w="12700">
-              <a:solidFill>
-                <a:schemeClr val="tx1"/>
-              </a:solidFill>
-              <a:tailEnd type="triangle"/>
-            </a:ln>
-          </p:spPr>
-          <p:style>
-            <a:lnRef idx="1">
-              <a:schemeClr val="accent1"/>
-            </a:lnRef>
-            <a:fillRef idx="0">
-              <a:schemeClr val="accent1"/>
-            </a:fillRef>
-            <a:effectRef idx="0">
-              <a:schemeClr val="accent1"/>
-            </a:effectRef>
-            <a:fontRef idx="minor">
+            </a:solidFill>
+          </a:ln>
+        </p:spPr>
+        <p:txBody>
+          <a:bodyPr wrap="square" lIns="108000" tIns="72000" rIns="108000" bIns="72000" rtlCol="0" anchor="ctr" anchorCtr="1">
+            <a:spAutoFit/>
+          </a:bodyPr>
+          <a:lstStyle/>
+          <a:p>
+            <a:pPr algn="ctr">
+              <a:lnSpc>
+                <a:spcPct val="150000"/>
+              </a:lnSpc>
+            </a:pPr>
+            <a:r>
+              <a:rPr kumimoji="1" lang="zh-CN" altLang="en-US" dirty="0">
+                <a:latin typeface="SimSun" panose="02010600030101010101" pitchFamily="2" charset="-122"/>
+                <a:ea typeface="SimSun" panose="02010600030101010101" pitchFamily="2" charset="-122"/>
+              </a:rPr>
+              <a:t>大于阈值</a:t>
+            </a:r>
+          </a:p>
+        </p:txBody>
+      </p:sp>
+      <p:sp>
+        <p:nvSpPr>
+          <p:cNvPr id="11" name="文本框 10">
+            <a:extLst>
+              <a:ext uri="{FF2B5EF4-FFF2-40B4-BE49-F238E27FC236}">
+                <a16:creationId xmlns:a16="http://schemas.microsoft.com/office/drawing/2014/main" id="{C6F3A263-F583-7718-2E75-87695186F583}"/>
+              </a:ext>
+            </a:extLst>
+          </p:cNvPr>
+          <p:cNvSpPr txBox="1">
+            <a:spLocks/>
+          </p:cNvSpPr>
+          <p:nvPr/>
+        </p:nvSpPr>
+        <p:spPr>
+          <a:xfrm>
+            <a:off x="6112121" y="3976796"/>
+            <a:ext cx="1290026" cy="495951"/>
+          </a:xfrm>
+          <a:prstGeom prst="rect">
+            <a:avLst/>
+          </a:prstGeom>
+          <a:noFill/>
+          <a:ln w="12700">
+            <a:solidFill>
               <a:schemeClr val="tx1"/>
-            </a:fontRef>
-          </p:style>
-        </p:cxnSp>
-        <p:cxnSp>
-          <p:nvCxnSpPr>
-            <p:cNvPr id="29" name="肘形连接符 28">
-              <a:extLst>
-                <a:ext uri="{FF2B5EF4-FFF2-40B4-BE49-F238E27FC236}">
-                  <a16:creationId xmlns:a16="http://schemas.microsoft.com/office/drawing/2014/main" id="{1EBFFA7D-60B5-BBF8-03EA-20E60AEF24FE}"/>
-                </a:ext>
-              </a:extLst>
-            </p:cNvPr>
-            <p:cNvCxnSpPr>
-              <a:stCxn id="11" idx="3"/>
-              <a:endCxn id="8" idx="3"/>
-            </p:cNvCxnSpPr>
-            <p:nvPr/>
-          </p:nvCxnSpPr>
-          <p:spPr>
-            <a:xfrm flipH="1" flipV="1">
-              <a:off x="4919239" y="2408169"/>
-              <a:ext cx="2493794" cy="2800072"/>
-            </a:xfrm>
-            <a:prstGeom prst="bentConnector3">
-              <a:avLst>
-                <a:gd name="adj1" fmla="val -9167"/>
-              </a:avLst>
-            </a:prstGeom>
-            <a:ln w="12700">
-              <a:solidFill>
-                <a:schemeClr val="tx1"/>
-              </a:solidFill>
-              <a:tailEnd type="triangle"/>
-            </a:ln>
-          </p:spPr>
-          <p:style>
-            <a:lnRef idx="1">
-              <a:schemeClr val="accent1"/>
-            </a:lnRef>
-            <a:fillRef idx="0">
-              <a:schemeClr val="accent1"/>
-            </a:fillRef>
-            <a:effectRef idx="0">
-              <a:schemeClr val="accent1"/>
-            </a:effectRef>
-            <a:fontRef idx="minor">
+            </a:solidFill>
+          </a:ln>
+        </p:spPr>
+        <p:txBody>
+          <a:bodyPr wrap="square" lIns="108000" tIns="72000" rIns="108000" bIns="72000" rtlCol="0" anchor="ctr" anchorCtr="1">
+            <a:spAutoFit/>
+          </a:bodyPr>
+          <a:lstStyle/>
+          <a:p>
+            <a:pPr algn="ctr">
+              <a:lnSpc>
+                <a:spcPct val="150000"/>
+              </a:lnSpc>
+            </a:pPr>
+            <a:r>
+              <a:rPr kumimoji="1" lang="zh-CN" altLang="en-US" dirty="0">
+                <a:latin typeface="SimSun" panose="02010600030101010101" pitchFamily="2" charset="-122"/>
+                <a:ea typeface="SimSun" panose="02010600030101010101" pitchFamily="2" charset="-122"/>
+              </a:rPr>
+              <a:t>小于阈值</a:t>
+            </a:r>
+          </a:p>
+        </p:txBody>
+      </p:sp>
+      <p:sp>
+        <p:nvSpPr>
+          <p:cNvPr id="12" name="文本框 11">
+            <a:extLst>
+              <a:ext uri="{FF2B5EF4-FFF2-40B4-BE49-F238E27FC236}">
+                <a16:creationId xmlns:a16="http://schemas.microsoft.com/office/drawing/2014/main" id="{5A8A9BD2-053C-B738-4232-3379B6C05327}"/>
+              </a:ext>
+            </a:extLst>
+          </p:cNvPr>
+          <p:cNvSpPr txBox="1">
+            <a:spLocks/>
+          </p:cNvSpPr>
+          <p:nvPr/>
+        </p:nvSpPr>
+        <p:spPr>
+          <a:xfrm>
+            <a:off x="2865971" y="3945001"/>
+            <a:ext cx="2794737" cy="495951"/>
+          </a:xfrm>
+          <a:prstGeom prst="rect">
+            <a:avLst/>
+          </a:prstGeom>
+          <a:noFill/>
+          <a:ln w="12700">
+            <a:solidFill>
               <a:schemeClr val="tx1"/>
-            </a:fontRef>
-          </p:style>
-        </p:cxnSp>
-      </p:grpSp>
+            </a:solidFill>
+          </a:ln>
+        </p:spPr>
+        <p:txBody>
+          <a:bodyPr wrap="square" lIns="108000" tIns="72000" rIns="108000" bIns="72000" rtlCol="0" anchor="ctr" anchorCtr="1">
+            <a:spAutoFit/>
+          </a:bodyPr>
+          <a:lstStyle/>
+          <a:p>
+            <a:pPr algn="ctr">
+              <a:lnSpc>
+                <a:spcPct val="150000"/>
+              </a:lnSpc>
+            </a:pPr>
+            <a:r>
+              <a:rPr kumimoji="1" lang="zh-CN" altLang="en-US" dirty="0">
+                <a:latin typeface="SimSun" panose="02010600030101010101" pitchFamily="2" charset="-122"/>
+                <a:ea typeface="SimSun" panose="02010600030101010101" pitchFamily="2" charset="-122"/>
+              </a:rPr>
+              <a:t>达到可收集的最大样本量</a:t>
+            </a:r>
+          </a:p>
+        </p:txBody>
+      </p:sp>
+      <p:cxnSp>
+        <p:nvCxnSpPr>
+          <p:cNvPr id="19" name="直线箭头连接符 18">
+            <a:extLst>
+              <a:ext uri="{FF2B5EF4-FFF2-40B4-BE49-F238E27FC236}">
+                <a16:creationId xmlns:a16="http://schemas.microsoft.com/office/drawing/2014/main" id="{9A281429-C354-A33B-1A5A-1A300AFFE23B}"/>
+              </a:ext>
+            </a:extLst>
+          </p:cNvPr>
+          <p:cNvCxnSpPr>
+            <a:stCxn id="6" idx="2"/>
+            <a:endCxn id="8" idx="0"/>
+          </p:cNvCxnSpPr>
+          <p:nvPr/>
+        </p:nvCxnSpPr>
+        <p:spPr>
+          <a:xfrm flipH="1">
+            <a:off x="4263340" y="520482"/>
+            <a:ext cx="1" cy="656242"/>
+          </a:xfrm>
+          <a:prstGeom prst="straightConnector1">
+            <a:avLst/>
+          </a:prstGeom>
+          <a:ln w="12700">
+            <a:solidFill>
+              <a:schemeClr val="tx1"/>
+            </a:solidFill>
+            <a:tailEnd type="triangle"/>
+          </a:ln>
+        </p:spPr>
+        <p:style>
+          <a:lnRef idx="1">
+            <a:schemeClr val="accent1"/>
+          </a:lnRef>
+          <a:fillRef idx="0">
+            <a:schemeClr val="accent1"/>
+          </a:fillRef>
+          <a:effectRef idx="0">
+            <a:schemeClr val="accent1"/>
+          </a:effectRef>
+          <a:fontRef idx="minor">
+            <a:schemeClr val="tx1"/>
+          </a:fontRef>
+        </p:style>
+      </p:cxnSp>
+      <p:cxnSp>
+        <p:nvCxnSpPr>
+          <p:cNvPr id="20" name="直线箭头连接符 19">
+            <a:extLst>
+              <a:ext uri="{FF2B5EF4-FFF2-40B4-BE49-F238E27FC236}">
+                <a16:creationId xmlns:a16="http://schemas.microsoft.com/office/drawing/2014/main" id="{BDFC6DB0-DF8D-4368-CA3E-F5D7B8910AD6}"/>
+              </a:ext>
+            </a:extLst>
+          </p:cNvPr>
+          <p:cNvCxnSpPr>
+            <a:cxnSpLocks/>
+            <a:endCxn id="9" idx="0"/>
+          </p:cNvCxnSpPr>
+          <p:nvPr/>
+        </p:nvCxnSpPr>
+        <p:spPr>
+          <a:xfrm>
+            <a:off x="4263340" y="1652798"/>
+            <a:ext cx="0" cy="709366"/>
+          </a:xfrm>
+          <a:prstGeom prst="straightConnector1">
+            <a:avLst/>
+          </a:prstGeom>
+          <a:ln w="12700">
+            <a:solidFill>
+              <a:schemeClr val="tx1"/>
+            </a:solidFill>
+            <a:tailEnd type="triangle"/>
+          </a:ln>
+        </p:spPr>
+        <p:style>
+          <a:lnRef idx="1">
+            <a:schemeClr val="accent1"/>
+          </a:lnRef>
+          <a:fillRef idx="0">
+            <a:schemeClr val="accent1"/>
+          </a:fillRef>
+          <a:effectRef idx="0">
+            <a:schemeClr val="accent1"/>
+          </a:effectRef>
+          <a:fontRef idx="minor">
+            <a:schemeClr val="tx1"/>
+          </a:fontRef>
+        </p:style>
+      </p:cxnSp>
+      <p:cxnSp>
+        <p:nvCxnSpPr>
+          <p:cNvPr id="22" name="直线箭头连接符 21">
+            <a:extLst>
+              <a:ext uri="{FF2B5EF4-FFF2-40B4-BE49-F238E27FC236}">
+                <a16:creationId xmlns:a16="http://schemas.microsoft.com/office/drawing/2014/main" id="{D12B0A56-CDB5-43DD-9F6C-CC4A0B291173}"/>
+              </a:ext>
+            </a:extLst>
+          </p:cNvPr>
+          <p:cNvCxnSpPr>
+            <a:cxnSpLocks/>
+            <a:endCxn id="12" idx="0"/>
+          </p:cNvCxnSpPr>
+          <p:nvPr/>
+        </p:nvCxnSpPr>
+        <p:spPr>
+          <a:xfrm flipH="1">
+            <a:off x="4263340" y="2858115"/>
+            <a:ext cx="5096" cy="1086886"/>
+          </a:xfrm>
+          <a:prstGeom prst="straightConnector1">
+            <a:avLst/>
+          </a:prstGeom>
+          <a:ln w="12700">
+            <a:solidFill>
+              <a:schemeClr val="tx1"/>
+            </a:solidFill>
+            <a:tailEnd type="triangle"/>
+          </a:ln>
+        </p:spPr>
+        <p:style>
+          <a:lnRef idx="1">
+            <a:schemeClr val="accent1"/>
+          </a:lnRef>
+          <a:fillRef idx="0">
+            <a:schemeClr val="accent1"/>
+          </a:fillRef>
+          <a:effectRef idx="0">
+            <a:schemeClr val="accent1"/>
+          </a:effectRef>
+          <a:fontRef idx="minor">
+            <a:schemeClr val="tx1"/>
+          </a:fontRef>
+        </p:style>
+      </p:cxnSp>
+      <p:cxnSp>
+        <p:nvCxnSpPr>
+          <p:cNvPr id="25" name="肘形连接符 24">
+            <a:extLst>
+              <a:ext uri="{FF2B5EF4-FFF2-40B4-BE49-F238E27FC236}">
+                <a16:creationId xmlns:a16="http://schemas.microsoft.com/office/drawing/2014/main" id="{1F121301-0924-8857-7B64-34C49FA7A649}"/>
+              </a:ext>
+            </a:extLst>
+          </p:cNvPr>
+          <p:cNvCxnSpPr>
+            <a:stCxn id="9" idx="1"/>
+            <a:endCxn id="10" idx="0"/>
+          </p:cNvCxnSpPr>
+          <p:nvPr/>
+        </p:nvCxnSpPr>
+        <p:spPr>
+          <a:xfrm rot="10800000" flipV="1">
+            <a:off x="1769545" y="2610140"/>
+            <a:ext cx="1096426" cy="1334860"/>
+          </a:xfrm>
+          <a:prstGeom prst="bentConnector2">
+            <a:avLst/>
+          </a:prstGeom>
+          <a:ln w="12700">
+            <a:solidFill>
+              <a:schemeClr val="tx1"/>
+            </a:solidFill>
+            <a:tailEnd type="triangle"/>
+          </a:ln>
+        </p:spPr>
+        <p:style>
+          <a:lnRef idx="1">
+            <a:schemeClr val="accent1"/>
+          </a:lnRef>
+          <a:fillRef idx="0">
+            <a:schemeClr val="accent1"/>
+          </a:fillRef>
+          <a:effectRef idx="0">
+            <a:schemeClr val="accent1"/>
+          </a:effectRef>
+          <a:fontRef idx="minor">
+            <a:schemeClr val="tx1"/>
+          </a:fontRef>
+        </p:style>
+      </p:cxnSp>
+      <p:cxnSp>
+        <p:nvCxnSpPr>
+          <p:cNvPr id="27" name="肘形连接符 26">
+            <a:extLst>
+              <a:ext uri="{FF2B5EF4-FFF2-40B4-BE49-F238E27FC236}">
+                <a16:creationId xmlns:a16="http://schemas.microsoft.com/office/drawing/2014/main" id="{027C94CA-48D6-7855-A05B-6DCD58DA7697}"/>
+              </a:ext>
+            </a:extLst>
+          </p:cNvPr>
+          <p:cNvCxnSpPr>
+            <a:stCxn id="9" idx="3"/>
+            <a:endCxn id="11" idx="0"/>
+          </p:cNvCxnSpPr>
+          <p:nvPr/>
+        </p:nvCxnSpPr>
+        <p:spPr>
+          <a:xfrm>
+            <a:off x="5660708" y="2610140"/>
+            <a:ext cx="1096426" cy="1366656"/>
+          </a:xfrm>
+          <a:prstGeom prst="bentConnector2">
+            <a:avLst/>
+          </a:prstGeom>
+          <a:ln w="12700">
+            <a:solidFill>
+              <a:schemeClr val="tx1"/>
+            </a:solidFill>
+            <a:tailEnd type="triangle"/>
+          </a:ln>
+        </p:spPr>
+        <p:style>
+          <a:lnRef idx="1">
+            <a:schemeClr val="accent1"/>
+          </a:lnRef>
+          <a:fillRef idx="0">
+            <a:schemeClr val="accent1"/>
+          </a:fillRef>
+          <a:effectRef idx="0">
+            <a:schemeClr val="accent1"/>
+          </a:effectRef>
+          <a:fontRef idx="minor">
+            <a:schemeClr val="tx1"/>
+          </a:fontRef>
+        </p:style>
+      </p:cxnSp>
+      <p:cxnSp>
+        <p:nvCxnSpPr>
+          <p:cNvPr id="29" name="肘形连接符 28">
+            <a:extLst>
+              <a:ext uri="{FF2B5EF4-FFF2-40B4-BE49-F238E27FC236}">
+                <a16:creationId xmlns:a16="http://schemas.microsoft.com/office/drawing/2014/main" id="{1EBFFA7D-60B5-BBF8-03EA-20E60AEF24FE}"/>
+              </a:ext>
+            </a:extLst>
+          </p:cNvPr>
+          <p:cNvCxnSpPr>
+            <a:stCxn id="11" idx="3"/>
+            <a:endCxn id="8" idx="3"/>
+          </p:cNvCxnSpPr>
+          <p:nvPr/>
+        </p:nvCxnSpPr>
+        <p:spPr>
+          <a:xfrm flipH="1" flipV="1">
+            <a:off x="4908353" y="1424700"/>
+            <a:ext cx="2493794" cy="2800072"/>
+          </a:xfrm>
+          <a:prstGeom prst="bentConnector3">
+            <a:avLst>
+              <a:gd name="adj1" fmla="val -9167"/>
+            </a:avLst>
+          </a:prstGeom>
+          <a:ln w="12700">
+            <a:solidFill>
+              <a:schemeClr val="tx1"/>
+            </a:solidFill>
+            <a:tailEnd type="triangle"/>
+          </a:ln>
+        </p:spPr>
+        <p:style>
+          <a:lnRef idx="1">
+            <a:schemeClr val="accent1"/>
+          </a:lnRef>
+          <a:fillRef idx="0">
+            <a:schemeClr val="accent1"/>
+          </a:fillRef>
+          <a:effectRef idx="0">
+            <a:schemeClr val="accent1"/>
+          </a:effectRef>
+          <a:fontRef idx="minor">
+            <a:schemeClr val="tx1"/>
+          </a:fontRef>
+        </p:style>
+      </p:cxnSp>
+      <p:sp>
+        <p:nvSpPr>
+          <p:cNvPr id="24" name="文本框 23">
+            <a:extLst>
+              <a:ext uri="{FF2B5EF4-FFF2-40B4-BE49-F238E27FC236}">
+                <a16:creationId xmlns:a16="http://schemas.microsoft.com/office/drawing/2014/main" id="{93613E70-DB45-9EB2-75C9-24E07341C05A}"/>
+              </a:ext>
+            </a:extLst>
+          </p:cNvPr>
+          <p:cNvSpPr txBox="1">
+            <a:spLocks/>
+          </p:cNvSpPr>
+          <p:nvPr/>
+        </p:nvSpPr>
+        <p:spPr>
+          <a:xfrm>
+            <a:off x="1773813" y="5354048"/>
+            <a:ext cx="1834313" cy="495951"/>
+          </a:xfrm>
+          <a:prstGeom prst="rect">
+            <a:avLst/>
+          </a:prstGeom>
+          <a:noFill/>
+          <a:ln w="12700">
+            <a:solidFill>
+              <a:schemeClr val="tx1"/>
+            </a:solidFill>
+          </a:ln>
+        </p:spPr>
+        <p:txBody>
+          <a:bodyPr wrap="square" lIns="108000" tIns="72000" rIns="108000" bIns="72000" rtlCol="0" anchor="ctr" anchorCtr="1">
+            <a:spAutoFit/>
+          </a:bodyPr>
+          <a:lstStyle/>
+          <a:p>
+            <a:pPr algn="ctr">
+              <a:lnSpc>
+                <a:spcPct val="150000"/>
+              </a:lnSpc>
+            </a:pPr>
+            <a:r>
+              <a:rPr kumimoji="1" lang="zh-CN" altLang="en-US" dirty="0">
+                <a:latin typeface="SimSun" panose="02010600030101010101" pitchFamily="2" charset="-122"/>
+                <a:ea typeface="SimSun" panose="02010600030101010101" pitchFamily="2" charset="-122"/>
+              </a:rPr>
+              <a:t>报告相应统计量</a:t>
+            </a:r>
+          </a:p>
+        </p:txBody>
+      </p:sp>
+      <p:cxnSp>
+        <p:nvCxnSpPr>
+          <p:cNvPr id="28" name="肘形连接符 27">
+            <a:extLst>
+              <a:ext uri="{FF2B5EF4-FFF2-40B4-BE49-F238E27FC236}">
+                <a16:creationId xmlns:a16="http://schemas.microsoft.com/office/drawing/2014/main" id="{62D55827-CD09-DE84-1E30-DE7AF46E413B}"/>
+              </a:ext>
+            </a:extLst>
+          </p:cNvPr>
+          <p:cNvCxnSpPr>
+            <a:cxnSpLocks/>
+            <a:stCxn id="10" idx="2"/>
+          </p:cNvCxnSpPr>
+          <p:nvPr/>
+        </p:nvCxnSpPr>
+        <p:spPr>
+          <a:xfrm rot="16200000" flipH="1">
+            <a:off x="1771574" y="4438922"/>
+            <a:ext cx="913098" cy="917156"/>
+          </a:xfrm>
+          <a:prstGeom prst="bentConnector3">
+            <a:avLst/>
+          </a:prstGeom>
+          <a:ln w="12700">
+            <a:tailEnd type="triangle"/>
+          </a:ln>
+        </p:spPr>
+        <p:style>
+          <a:lnRef idx="1">
+            <a:schemeClr val="dk1"/>
+          </a:lnRef>
+          <a:fillRef idx="0">
+            <a:schemeClr val="dk1"/>
+          </a:fillRef>
+          <a:effectRef idx="0">
+            <a:schemeClr val="dk1"/>
+          </a:effectRef>
+          <a:fontRef idx="minor">
+            <a:schemeClr val="tx1"/>
+          </a:fontRef>
+        </p:style>
+      </p:cxnSp>
+      <p:cxnSp>
+        <p:nvCxnSpPr>
+          <p:cNvPr id="32" name="肘形连接符 31">
+            <a:extLst>
+              <a:ext uri="{FF2B5EF4-FFF2-40B4-BE49-F238E27FC236}">
+                <a16:creationId xmlns:a16="http://schemas.microsoft.com/office/drawing/2014/main" id="{538E5C9D-DF72-48AE-CE45-744C84B77E38}"/>
+              </a:ext>
+            </a:extLst>
+          </p:cNvPr>
+          <p:cNvCxnSpPr>
+            <a:cxnSpLocks/>
+            <a:stCxn id="12" idx="2"/>
+          </p:cNvCxnSpPr>
+          <p:nvPr/>
+        </p:nvCxnSpPr>
+        <p:spPr>
+          <a:xfrm rot="5400000">
+            <a:off x="3018473" y="4109181"/>
+            <a:ext cx="913097" cy="1576639"/>
+          </a:xfrm>
+          <a:prstGeom prst="bentConnector3">
+            <a:avLst/>
+          </a:prstGeom>
+          <a:ln w="12700">
+            <a:tailEnd type="triangle"/>
+          </a:ln>
+        </p:spPr>
+        <p:style>
+          <a:lnRef idx="1">
+            <a:schemeClr val="dk1"/>
+          </a:lnRef>
+          <a:fillRef idx="0">
+            <a:schemeClr val="dk1"/>
+          </a:fillRef>
+          <a:effectRef idx="0">
+            <a:schemeClr val="dk1"/>
+          </a:effectRef>
+          <a:fontRef idx="minor">
+            <a:schemeClr val="tx1"/>
+          </a:fontRef>
+        </p:style>
+      </p:cxnSp>
     </p:spTree>
     <p:extLst>
       <p:ext uri="{BB962C8B-B14F-4D97-AF65-F5344CB8AC3E}">

</xml_diff>